<commit_message>
ajout de la solution technique
</commit_message>
<xml_diff>
--- a/doc/Soutenance Projet 4.pptx
+++ b/doc/Soutenance Projet 4.pptx
@@ -14,6 +14,9 @@
     <p:sldId id="262" r:id="rId8"/>
     <p:sldId id="263" r:id="rId9"/>
     <p:sldId id="264" r:id="rId10"/>
+    <p:sldId id="265" r:id="rId11"/>
+    <p:sldId id="266" r:id="rId12"/>
+    <p:sldId id="267" r:id="rId13"/>
   </p:sldIdLst>
   <p:sldSz cx="9144000" cy="6858000" type="screen4x3"/>
   <p:notesSz cx="6858000" cy="9144000"/>
@@ -3252,6 +3255,351 @@
       </p:par>
     </p:tnLst>
   </p:timing>
+</p:sld>
+</file>
+
+<file path=ppt/slides/slide10.xml><?xml version="1.0" encoding="utf-8"?>
+<p:sld xmlns:a="http://schemas.openxmlformats.org/drawingml/2006/main" xmlns:r="http://schemas.openxmlformats.org/officeDocument/2006/relationships" xmlns:p="http://schemas.openxmlformats.org/presentationml/2006/main">
+  <p:cSld>
+    <p:spTree>
+      <p:nvGrpSpPr>
+        <p:cNvPr id="1" name=""/>
+        <p:cNvGrpSpPr/>
+        <p:nvPr/>
+      </p:nvGrpSpPr>
+      <p:grpSpPr>
+        <a:xfrm>
+          <a:off x="0" y="0"/>
+          <a:ext cx="0" cy="0"/>
+          <a:chOff x="0" y="0"/>
+          <a:chExt cx="0" cy="0"/>
+        </a:xfrm>
+      </p:grpSpPr>
+      <p:sp>
+        <p:nvSpPr>
+          <p:cNvPr id="2" name="Titre 1"/>
+          <p:cNvSpPr>
+            <a:spLocks noGrp="1"/>
+          </p:cNvSpPr>
+          <p:nvPr>
+            <p:ph type="title"/>
+          </p:nvPr>
+        </p:nvSpPr>
+        <p:spPr/>
+        <p:txBody>
+          <a:bodyPr/>
+          <a:lstStyle/>
+          <a:p>
+            <a:r>
+              <a:rPr lang="fr-FR" dirty="0" smtClean="0"/>
+              <a:t>Diagramme d’activité?</a:t>
+            </a:r>
+            <a:endParaRPr lang="fr-FR" dirty="0"/>
+          </a:p>
+        </p:txBody>
+      </p:sp>
+      <p:sp>
+        <p:nvSpPr>
+          <p:cNvPr id="3" name="Espace réservé du contenu 2"/>
+          <p:cNvSpPr>
+            <a:spLocks noGrp="1"/>
+          </p:cNvSpPr>
+          <p:nvPr>
+            <p:ph idx="1"/>
+          </p:nvPr>
+        </p:nvSpPr>
+        <p:spPr/>
+        <p:txBody>
+          <a:bodyPr/>
+          <a:lstStyle/>
+          <a:p>
+            <a:endParaRPr lang="fr-FR"/>
+          </a:p>
+        </p:txBody>
+      </p:sp>
+    </p:spTree>
+    <p:extLst>
+      <p:ext uri="{BB962C8B-B14F-4D97-AF65-F5344CB8AC3E}">
+        <p14:creationId xmlns:p14="http://schemas.microsoft.com/office/powerpoint/2010/main" val="1085985140"/>
+      </p:ext>
+    </p:extLst>
+  </p:cSld>
+  <p:clrMapOvr>
+    <a:masterClrMapping/>
+  </p:clrMapOvr>
+</p:sld>
+</file>
+
+<file path=ppt/slides/slide11.xml><?xml version="1.0" encoding="utf-8"?>
+<p:sld xmlns:a="http://schemas.openxmlformats.org/drawingml/2006/main" xmlns:r="http://schemas.openxmlformats.org/officeDocument/2006/relationships" xmlns:p="http://schemas.openxmlformats.org/presentationml/2006/main">
+  <p:cSld>
+    <p:spTree>
+      <p:nvGrpSpPr>
+        <p:cNvPr id="1" name=""/>
+        <p:cNvGrpSpPr/>
+        <p:nvPr/>
+      </p:nvGrpSpPr>
+      <p:grpSpPr>
+        <a:xfrm>
+          <a:off x="0" y="0"/>
+          <a:ext cx="0" cy="0"/>
+          <a:chOff x="0" y="0"/>
+          <a:chExt cx="0" cy="0"/>
+        </a:xfrm>
+      </p:grpSpPr>
+      <p:sp>
+        <p:nvSpPr>
+          <p:cNvPr id="2" name="Titre 1"/>
+          <p:cNvSpPr>
+            <a:spLocks noGrp="1"/>
+          </p:cNvSpPr>
+          <p:nvPr>
+            <p:ph type="title"/>
+          </p:nvPr>
+        </p:nvSpPr>
+        <p:spPr/>
+        <p:txBody>
+          <a:bodyPr/>
+          <a:lstStyle/>
+          <a:p>
+            <a:r>
+              <a:rPr lang="fr-FR" dirty="0" smtClean="0"/>
+              <a:t>Fiches descriptives?</a:t>
+            </a:r>
+            <a:endParaRPr lang="fr-FR" dirty="0"/>
+          </a:p>
+        </p:txBody>
+      </p:sp>
+      <p:sp>
+        <p:nvSpPr>
+          <p:cNvPr id="3" name="Espace réservé du contenu 2"/>
+          <p:cNvSpPr>
+            <a:spLocks noGrp="1"/>
+          </p:cNvSpPr>
+          <p:nvPr>
+            <p:ph idx="1"/>
+          </p:nvPr>
+        </p:nvSpPr>
+        <p:spPr/>
+        <p:txBody>
+          <a:bodyPr/>
+          <a:lstStyle/>
+          <a:p>
+            <a:endParaRPr lang="fr-FR"/>
+          </a:p>
+        </p:txBody>
+      </p:sp>
+    </p:spTree>
+    <p:extLst>
+      <p:ext uri="{BB962C8B-B14F-4D97-AF65-F5344CB8AC3E}">
+        <p14:creationId xmlns:p14="http://schemas.microsoft.com/office/powerpoint/2010/main" val="2802766451"/>
+      </p:ext>
+    </p:extLst>
+  </p:cSld>
+  <p:clrMapOvr>
+    <a:masterClrMapping/>
+  </p:clrMapOvr>
+</p:sld>
+</file>
+
+<file path=ppt/slides/slide12.xml><?xml version="1.0" encoding="utf-8"?>
+<p:sld xmlns:a="http://schemas.openxmlformats.org/drawingml/2006/main" xmlns:r="http://schemas.openxmlformats.org/officeDocument/2006/relationships" xmlns:p="http://schemas.openxmlformats.org/presentationml/2006/main">
+  <p:cSld>
+    <p:spTree>
+      <p:nvGrpSpPr>
+        <p:cNvPr id="1" name=""/>
+        <p:cNvGrpSpPr/>
+        <p:nvPr/>
+      </p:nvGrpSpPr>
+      <p:grpSpPr>
+        <a:xfrm>
+          <a:off x="0" y="0"/>
+          <a:ext cx="0" cy="0"/>
+          <a:chOff x="0" y="0"/>
+          <a:chExt cx="0" cy="0"/>
+        </a:xfrm>
+      </p:grpSpPr>
+      <p:sp>
+        <p:nvSpPr>
+          <p:cNvPr id="2" name="Titre 1"/>
+          <p:cNvSpPr>
+            <a:spLocks noGrp="1"/>
+          </p:cNvSpPr>
+          <p:nvPr>
+            <p:ph type="title"/>
+          </p:nvPr>
+        </p:nvSpPr>
+        <p:spPr/>
+        <p:txBody>
+          <a:bodyPr/>
+          <a:lstStyle/>
+          <a:p>
+            <a:r>
+              <a:rPr lang="fr-FR" dirty="0" smtClean="0"/>
+              <a:t>Solution Technique</a:t>
+            </a:r>
+            <a:endParaRPr lang="fr-FR" dirty="0"/>
+          </a:p>
+        </p:txBody>
+      </p:sp>
+      <p:pic>
+        <p:nvPicPr>
+          <p:cNvPr id="4" name="Espace réservé du contenu 3"/>
+          <p:cNvPicPr>
+            <a:picLocks noGrp="1" noChangeAspect="1"/>
+          </p:cNvPicPr>
+          <p:nvPr>
+            <p:ph idx="1"/>
+          </p:nvPr>
+        </p:nvPicPr>
+        <p:blipFill>
+          <a:blip r:embed="rId2">
+            <a:extLst>
+              <a:ext uri="{28A0092B-C50C-407E-A947-70E740481C1C}">
+                <a14:useLocalDpi xmlns:a14="http://schemas.microsoft.com/office/drawing/2010/main" val="0"/>
+              </a:ext>
+            </a:extLst>
+          </a:blip>
+          <a:stretch>
+            <a:fillRect/>
+          </a:stretch>
+        </p:blipFill>
+        <p:spPr>
+          <a:xfrm>
+            <a:off x="1115616" y="2348880"/>
+            <a:ext cx="3790950" cy="2466975"/>
+          </a:xfrm>
+        </p:spPr>
+      </p:pic>
+      <p:pic>
+        <p:nvPicPr>
+          <p:cNvPr id="1028" name="Picture 4" descr="https://i.ytimg.com/vi/Xlp9G137-MI/maxresdefault.jpg"/>
+          <p:cNvPicPr>
+            <a:picLocks noChangeAspect="1" noChangeArrowheads="1"/>
+          </p:cNvPicPr>
+          <p:nvPr/>
+        </p:nvPicPr>
+        <p:blipFill rotWithShape="1">
+          <a:blip r:embed="rId3" cstate="print">
+            <a:extLst>
+              <a:ext uri="{28A0092B-C50C-407E-A947-70E740481C1C}">
+                <a14:useLocalDpi xmlns:a14="http://schemas.microsoft.com/office/drawing/2010/main" val="0"/>
+              </a:ext>
+            </a:extLst>
+          </a:blip>
+          <a:srcRect l="16246" r="14980"/>
+          <a:stretch/>
+        </p:blipFill>
+        <p:spPr bwMode="auto">
+          <a:xfrm>
+            <a:off x="5364088" y="1988840"/>
+            <a:ext cx="2444723" cy="1999542"/>
+          </a:xfrm>
+          <a:prstGeom prst="rect">
+            <a:avLst/>
+          </a:prstGeom>
+          <a:noFill/>
+          <a:extLst>
+            <a:ext uri="{909E8E84-426E-40DD-AFC4-6F175D3DCCD1}">
+              <a14:hiddenFill xmlns:a14="http://schemas.microsoft.com/office/drawing/2010/main">
+                <a:solidFill>
+                  <a:srgbClr val="FFFFFF"/>
+                </a:solidFill>
+              </a14:hiddenFill>
+            </a:ext>
+          </a:extLst>
+        </p:spPr>
+      </p:pic>
+      <p:pic>
+        <p:nvPicPr>
+          <p:cNvPr id="1030" name="Picture 6" descr="RÃ©sultat de recherche d'images pour &quot;html5 css bootstrap&quot;"/>
+          <p:cNvPicPr>
+            <a:picLocks noChangeAspect="1" noChangeArrowheads="1"/>
+          </p:cNvPicPr>
+          <p:nvPr/>
+        </p:nvPicPr>
+        <p:blipFill rotWithShape="1">
+          <a:blip r:embed="rId4" cstate="print">
+            <a:extLst>
+              <a:ext uri="{28A0092B-C50C-407E-A947-70E740481C1C}">
+                <a14:useLocalDpi xmlns:a14="http://schemas.microsoft.com/office/drawing/2010/main" val="0"/>
+              </a:ext>
+            </a:extLst>
+          </a:blip>
+          <a:srcRect t="26468" b="24598"/>
+          <a:stretch/>
+        </p:blipFill>
+        <p:spPr bwMode="auto">
+          <a:xfrm>
+            <a:off x="5269358" y="4193088"/>
+            <a:ext cx="2634182" cy="867518"/>
+          </a:xfrm>
+          <a:prstGeom prst="rect">
+            <a:avLst/>
+          </a:prstGeom>
+          <a:noFill/>
+          <a:extLst>
+            <a:ext uri="{909E8E84-426E-40DD-AFC4-6F175D3DCCD1}">
+              <a14:hiddenFill xmlns:a14="http://schemas.microsoft.com/office/drawing/2010/main">
+                <a:solidFill>
+                  <a:srgbClr val="FFFFFF"/>
+                </a:solidFill>
+              </a14:hiddenFill>
+            </a:ext>
+          </a:extLst>
+        </p:spPr>
+      </p:pic>
+      <p:pic>
+        <p:nvPicPr>
+          <p:cNvPr id="1032" name="Picture 8" descr="RÃ©sultat de recherche d'images pour &quot;facebook&quot;"/>
+          <p:cNvPicPr>
+            <a:picLocks noChangeAspect="1" noChangeArrowheads="1"/>
+          </p:cNvPicPr>
+          <p:nvPr/>
+        </p:nvPicPr>
+        <p:blipFill>
+          <a:blip r:embed="rId5" cstate="print">
+            <a:extLst>
+              <a:ext uri="{28A0092B-C50C-407E-A947-70E740481C1C}">
+                <a14:useLocalDpi xmlns:a14="http://schemas.microsoft.com/office/drawing/2010/main" val="0"/>
+              </a:ext>
+            </a:extLst>
+          </a:blip>
+          <a:srcRect/>
+          <a:stretch>
+            <a:fillRect/>
+          </a:stretch>
+        </p:blipFill>
+        <p:spPr bwMode="auto">
+          <a:xfrm>
+            <a:off x="251520" y="2852936"/>
+            <a:ext cx="599923" cy="599923"/>
+          </a:xfrm>
+          <a:prstGeom prst="rect">
+            <a:avLst/>
+          </a:prstGeom>
+          <a:noFill/>
+          <a:extLst>
+            <a:ext uri="{909E8E84-426E-40DD-AFC4-6F175D3DCCD1}">
+              <a14:hiddenFill xmlns:a14="http://schemas.microsoft.com/office/drawing/2010/main">
+                <a:solidFill>
+                  <a:srgbClr val="FFFFFF"/>
+                </a:solidFill>
+              </a14:hiddenFill>
+            </a:ext>
+          </a:extLst>
+        </p:spPr>
+      </p:pic>
+    </p:spTree>
+    <p:extLst>
+      <p:ext uri="{BB962C8B-B14F-4D97-AF65-F5344CB8AC3E}">
+        <p14:creationId xmlns:p14="http://schemas.microsoft.com/office/powerpoint/2010/main" val="1597518876"/>
+      </p:ext>
+    </p:extLst>
+  </p:cSld>
+  <p:clrMapOvr>
+    <a:masterClrMapping/>
+  </p:clrMapOvr>
 </p:sld>
 </file>
 

</xml_diff>

<commit_message>
ajout de la présentation
</commit_message>
<xml_diff>
--- a/doc/Soutenance Projet 4.pptx
+++ b/doc/Soutenance Projet 4.pptx
@@ -6,10 +6,11 @@
   </p:sldMasterIdLst>
   <p:sldIdLst>
     <p:sldId id="256" r:id="rId2"/>
-    <p:sldId id="267" r:id="rId3"/>
-    <p:sldId id="268" r:id="rId4"/>
-    <p:sldId id="269" r:id="rId5"/>
-    <p:sldId id="270" r:id="rId6"/>
+    <p:sldId id="271" r:id="rId3"/>
+    <p:sldId id="267" r:id="rId4"/>
+    <p:sldId id="268" r:id="rId5"/>
+    <p:sldId id="269" r:id="rId6"/>
+    <p:sldId id="270" r:id="rId7"/>
   </p:sldIdLst>
   <p:sldSz cx="9144000" cy="6858000" type="screen4x3"/>
   <p:notesSz cx="6858000" cy="9144000"/>
@@ -305,7 +306,7 @@
           <a:p>
             <a:fld id="{68D2A190-2E15-4580-BE51-37CB25FABE32}" type="datetimeFigureOut">
               <a:rPr lang="fr-FR" smtClean="0"/>
-              <a:t>23/01/2019</a:t>
+              <a:t>24/01/2019</a:t>
             </a:fld>
             <a:endParaRPr lang="fr-FR"/>
           </a:p>
@@ -470,7 +471,7 @@
           <a:p>
             <a:fld id="{68D2A190-2E15-4580-BE51-37CB25FABE32}" type="datetimeFigureOut">
               <a:rPr lang="fr-FR" smtClean="0"/>
-              <a:t>23/01/2019</a:t>
+              <a:t>24/01/2019</a:t>
             </a:fld>
             <a:endParaRPr lang="fr-FR"/>
           </a:p>
@@ -645,7 +646,7 @@
           <a:p>
             <a:fld id="{68D2A190-2E15-4580-BE51-37CB25FABE32}" type="datetimeFigureOut">
               <a:rPr lang="fr-FR" smtClean="0"/>
-              <a:t>23/01/2019</a:t>
+              <a:t>24/01/2019</a:t>
             </a:fld>
             <a:endParaRPr lang="fr-FR"/>
           </a:p>
@@ -810,7 +811,7 @@
           <a:p>
             <a:fld id="{68D2A190-2E15-4580-BE51-37CB25FABE32}" type="datetimeFigureOut">
               <a:rPr lang="fr-FR" smtClean="0"/>
-              <a:t>23/01/2019</a:t>
+              <a:t>24/01/2019</a:t>
             </a:fld>
             <a:endParaRPr lang="fr-FR"/>
           </a:p>
@@ -1051,7 +1052,7 @@
           <a:p>
             <a:fld id="{68D2A190-2E15-4580-BE51-37CB25FABE32}" type="datetimeFigureOut">
               <a:rPr lang="fr-FR" smtClean="0"/>
-              <a:t>23/01/2019</a:t>
+              <a:t>24/01/2019</a:t>
             </a:fld>
             <a:endParaRPr lang="fr-FR"/>
           </a:p>
@@ -1334,7 +1335,7 @@
           <a:p>
             <a:fld id="{68D2A190-2E15-4580-BE51-37CB25FABE32}" type="datetimeFigureOut">
               <a:rPr lang="fr-FR" smtClean="0"/>
-              <a:t>23/01/2019</a:t>
+              <a:t>24/01/2019</a:t>
             </a:fld>
             <a:endParaRPr lang="fr-FR"/>
           </a:p>
@@ -1763,7 +1764,7 @@
           <a:p>
             <a:fld id="{68D2A190-2E15-4580-BE51-37CB25FABE32}" type="datetimeFigureOut">
               <a:rPr lang="fr-FR" smtClean="0"/>
-              <a:t>23/01/2019</a:t>
+              <a:t>24/01/2019</a:t>
             </a:fld>
             <a:endParaRPr lang="fr-FR"/>
           </a:p>
@@ -1876,7 +1877,7 @@
           <a:p>
             <a:fld id="{68D2A190-2E15-4580-BE51-37CB25FABE32}" type="datetimeFigureOut">
               <a:rPr lang="fr-FR" smtClean="0"/>
-              <a:t>23/01/2019</a:t>
+              <a:t>24/01/2019</a:t>
             </a:fld>
             <a:endParaRPr lang="fr-FR"/>
           </a:p>
@@ -1966,7 +1967,7 @@
           <a:p>
             <a:fld id="{68D2A190-2E15-4580-BE51-37CB25FABE32}" type="datetimeFigureOut">
               <a:rPr lang="fr-FR" smtClean="0"/>
-              <a:t>23/01/2019</a:t>
+              <a:t>24/01/2019</a:t>
             </a:fld>
             <a:endParaRPr lang="fr-FR"/>
           </a:p>
@@ -2155,7 +2156,7 @@
           <a:p>
             <a:fld id="{68D2A190-2E15-4580-BE51-37CB25FABE32}" type="datetimeFigureOut">
               <a:rPr lang="fr-FR" smtClean="0"/>
-              <a:t>23/01/2019</a:t>
+              <a:t>24/01/2019</a:t>
             </a:fld>
             <a:endParaRPr lang="fr-FR"/>
           </a:p>
@@ -2473,7 +2474,7 @@
           <a:p>
             <a:fld id="{68D2A190-2E15-4580-BE51-37CB25FABE32}" type="datetimeFigureOut">
               <a:rPr lang="fr-FR" smtClean="0"/>
-              <a:t>23/01/2019</a:t>
+              <a:t>24/01/2019</a:t>
             </a:fld>
             <a:endParaRPr lang="fr-FR"/>
           </a:p>
@@ -2852,7 +2853,7 @@
           <a:p>
             <a:fld id="{68D2A190-2E15-4580-BE51-37CB25FABE32}" type="datetimeFigureOut">
               <a:rPr lang="fr-FR" smtClean="0"/>
-              <a:t>23/01/2019</a:t>
+              <a:t>24/01/2019</a:t>
             </a:fld>
             <a:endParaRPr lang="fr-FR"/>
           </a:p>
@@ -3285,6 +3286,155 @@
           <a:p>
             <a:r>
               <a:rPr lang="fr-FR" dirty="0" smtClean="0"/>
+              <a:t>Présentation</a:t>
+            </a:r>
+            <a:endParaRPr lang="fr-FR" dirty="0"/>
+          </a:p>
+        </p:txBody>
+      </p:sp>
+      <p:sp>
+        <p:nvSpPr>
+          <p:cNvPr id="3" name="Espace réservé du contenu 2"/>
+          <p:cNvSpPr>
+            <a:spLocks noGrp="1"/>
+          </p:cNvSpPr>
+          <p:nvPr>
+            <p:ph idx="1"/>
+          </p:nvPr>
+        </p:nvSpPr>
+        <p:spPr/>
+        <p:txBody>
+          <a:bodyPr/>
+          <a:lstStyle/>
+          <a:p>
+            <a:pPr marL="114300" indent="0" algn="ctr">
+              <a:buNone/>
+            </a:pPr>
+            <a:endParaRPr lang="fr-FR" sz="2800" b="1" dirty="0" smtClean="0"/>
+          </a:p>
+          <a:p>
+            <a:pPr marL="114300" indent="0" algn="ctr">
+              <a:buNone/>
+            </a:pPr>
+            <a:r>
+              <a:rPr lang="fr-FR" sz="2800" b="1" dirty="0" err="1" smtClean="0"/>
+              <a:t>Dev@Gogo</a:t>
+            </a:r>
+            <a:endParaRPr lang="fr-FR" sz="2800" b="1" dirty="0"/>
+          </a:p>
+          <a:p>
+            <a:pPr marL="114300" indent="0">
+              <a:buNone/>
+            </a:pPr>
+            <a:r>
+              <a:rPr lang="fr-FR" dirty="0" smtClean="0"/>
+              <a:t>Fondée en 2015</a:t>
+            </a:r>
+          </a:p>
+          <a:p>
+            <a:pPr marL="114300" indent="0">
+              <a:buNone/>
+            </a:pPr>
+            <a:r>
+              <a:rPr lang="fr-FR" dirty="0"/>
+              <a:t>12 collaborateurs</a:t>
+            </a:r>
+          </a:p>
+          <a:p>
+            <a:pPr marL="114300" indent="0">
+              <a:buNone/>
+            </a:pPr>
+            <a:r>
+              <a:rPr lang="fr-FR" dirty="0" smtClean="0"/>
+              <a:t>Clients </a:t>
+            </a:r>
+            <a:r>
+              <a:rPr lang="fr-FR" smtClean="0"/>
+              <a:t>: SMCF</a:t>
+            </a:r>
+            <a:r>
+              <a:rPr lang="fr-FR" dirty="0" smtClean="0"/>
+              <a:t>, Les paniers d’Alice, LeCoinPasMauvais.fr</a:t>
+            </a:r>
+          </a:p>
+          <a:p>
+            <a:endParaRPr lang="fr-FR" dirty="0"/>
+          </a:p>
+          <a:p>
+            <a:pPr marL="114300" indent="0" algn="ctr">
+              <a:buNone/>
+            </a:pPr>
+            <a:r>
+              <a:rPr lang="fr-FR" dirty="0" smtClean="0"/>
+              <a:t>Spécialiste des applications Web: </a:t>
+            </a:r>
+          </a:p>
+          <a:p>
+            <a:pPr marL="114300" indent="0" algn="ctr">
+              <a:buNone/>
+            </a:pPr>
+            <a:r>
+              <a:rPr lang="fr-FR" dirty="0" smtClean="0"/>
+              <a:t>De la </a:t>
+            </a:r>
+            <a:r>
+              <a:rPr lang="fr-FR" dirty="0"/>
+              <a:t>conception à </a:t>
+            </a:r>
+            <a:r>
+              <a:rPr lang="fr-FR" dirty="0" smtClean="0"/>
+              <a:t>l’écran de vos clients</a:t>
+            </a:r>
+          </a:p>
+        </p:txBody>
+      </p:sp>
+    </p:spTree>
+    <p:extLst>
+      <p:ext uri="{BB962C8B-B14F-4D97-AF65-F5344CB8AC3E}">
+        <p14:creationId xmlns:p14="http://schemas.microsoft.com/office/powerpoint/2010/main" val="249218596"/>
+      </p:ext>
+    </p:extLst>
+  </p:cSld>
+  <p:clrMapOvr>
+    <a:masterClrMapping/>
+  </p:clrMapOvr>
+</p:sld>
+</file>
+
+<file path=ppt/slides/slide3.xml><?xml version="1.0" encoding="utf-8"?>
+<p:sld xmlns:a="http://schemas.openxmlformats.org/drawingml/2006/main" xmlns:r="http://schemas.openxmlformats.org/officeDocument/2006/relationships" xmlns:p="http://schemas.openxmlformats.org/presentationml/2006/main">
+  <p:cSld>
+    <p:spTree>
+      <p:nvGrpSpPr>
+        <p:cNvPr id="1" name=""/>
+        <p:cNvGrpSpPr/>
+        <p:nvPr/>
+      </p:nvGrpSpPr>
+      <p:grpSpPr>
+        <a:xfrm>
+          <a:off x="0" y="0"/>
+          <a:ext cx="0" cy="0"/>
+          <a:chOff x="0" y="0"/>
+          <a:chExt cx="0" cy="0"/>
+        </a:xfrm>
+      </p:grpSpPr>
+      <p:sp>
+        <p:nvSpPr>
+          <p:cNvPr id="2" name="Titre 1"/>
+          <p:cNvSpPr>
+            <a:spLocks noGrp="1"/>
+          </p:cNvSpPr>
+          <p:nvPr>
+            <p:ph type="title"/>
+          </p:nvPr>
+        </p:nvSpPr>
+        <p:spPr/>
+        <p:txBody>
+          <a:bodyPr/>
+          <a:lstStyle/>
+          <a:p>
+            <a:r>
+              <a:rPr lang="fr-FR" dirty="0" smtClean="0"/>
               <a:t>La solution technique</a:t>
             </a:r>
             <a:endParaRPr lang="fr-FR" dirty="0"/>
@@ -3375,7 +3525,7 @@
 </p:sld>
 </file>
 
-<file path=ppt/slides/slide3.xml><?xml version="1.0" encoding="utf-8"?>
+<file path=ppt/slides/slide4.xml><?xml version="1.0" encoding="utf-8"?>
 <p:sld xmlns:a="http://schemas.openxmlformats.org/drawingml/2006/main" xmlns:r="http://schemas.openxmlformats.org/officeDocument/2006/relationships" xmlns:p="http://schemas.openxmlformats.org/presentationml/2006/main">
   <p:cSld>
     <p:spTree>
@@ -3505,7 +3655,7 @@
 </p:sld>
 </file>
 
-<file path=ppt/slides/slide4.xml><?xml version="1.0" encoding="utf-8"?>
+<file path=ppt/slides/slide5.xml><?xml version="1.0" encoding="utf-8"?>
 <p:sld xmlns:a="http://schemas.openxmlformats.org/drawingml/2006/main" xmlns:r="http://schemas.openxmlformats.org/officeDocument/2006/relationships" xmlns:p="http://schemas.openxmlformats.org/presentationml/2006/main">
   <p:cSld>
     <p:spTree>
@@ -3685,7 +3835,7 @@
 </p:sld>
 </file>
 
-<file path=ppt/slides/slide5.xml><?xml version="1.0" encoding="utf-8"?>
+<file path=ppt/slides/slide6.xml><?xml version="1.0" encoding="utf-8"?>
 <p:sld xmlns:a="http://schemas.openxmlformats.org/drawingml/2006/main" xmlns:r="http://schemas.openxmlformats.org/officeDocument/2006/relationships" xmlns:p="http://schemas.openxmlformats.org/presentationml/2006/main">
   <p:cSld>
     <p:spTree>

</xml_diff>